<commit_message>
Update Research and Ideas - Amy.pptx
</commit_message>
<xml_diff>
--- a/Research/Research and Ideas - Amy.pptx
+++ b/Research/Research and Ideas - Amy.pptx
@@ -5,16 +5,17 @@
     <p:sldMasterId id="2147483648" r:id="rId1"/>
   </p:sldMasterIdLst>
   <p:notesMasterIdLst>
-    <p:notesMasterId r:id="rId9"/>
+    <p:notesMasterId r:id="rId10"/>
   </p:notesMasterIdLst>
   <p:sldIdLst>
     <p:sldId id="256" r:id="rId2"/>
     <p:sldId id="257" r:id="rId3"/>
     <p:sldId id="262" r:id="rId4"/>
-    <p:sldId id="261" r:id="rId5"/>
-    <p:sldId id="258" r:id="rId6"/>
-    <p:sldId id="259" r:id="rId7"/>
-    <p:sldId id="260" r:id="rId8"/>
+    <p:sldId id="263" r:id="rId5"/>
+    <p:sldId id="261" r:id="rId6"/>
+    <p:sldId id="258" r:id="rId7"/>
+    <p:sldId id="259" r:id="rId8"/>
+    <p:sldId id="260" r:id="rId9"/>
   </p:sldIdLst>
   <p:sldSz cx="12192000" cy="6858000"/>
   <p:notesSz cx="6858000" cy="9144000"/>
@@ -203,7 +204,7 @@
           <a:p>
             <a:fld id="{577C4E89-E65F-4322-8B0D-668DB0E49F11}" type="datetimeFigureOut">
               <a:rPr lang="en-GB" smtClean="0"/>
-              <a:t>31/01/2019</a:t>
+              <a:t>03/02/2019</a:t>
             </a:fld>
             <a:endParaRPr lang="en-GB"/>
           </a:p>
@@ -549,7 +550,7 @@
           <a:p>
             <a:fld id="{BF8BF5F8-7557-4C42-B9AE-39DF8BF89C93}" type="slidenum">
               <a:rPr lang="en-GB" smtClean="0"/>
-              <a:t>6</a:t>
+              <a:t>7</a:t>
             </a:fld>
             <a:endParaRPr lang="en-GB"/>
           </a:p>
@@ -738,7 +739,7 @@
             <a:fld id="{87DE6118-2437-4B30-8E3C-4D2BE6020583}" type="datetimeFigureOut">
               <a:rPr lang="en-US" dirty="0"/>
               <a:pPr/>
-              <a:t>1/31/2019</a:t>
+              <a:t>2/3/2019</a:t>
             </a:fld>
             <a:endParaRPr lang="en-US" dirty="0"/>
           </a:p>
@@ -1064,7 +1065,7 @@
           <a:p>
             <a:fld id="{87DE6118-2437-4B30-8E3C-4D2BE6020583}" type="datetimeFigureOut">
               <a:rPr lang="en-US" dirty="0"/>
-              <a:t>1/31/2019</a:t>
+              <a:t>2/3/2019</a:t>
             </a:fld>
             <a:endParaRPr lang="en-US" dirty="0"/>
           </a:p>
@@ -1239,7 +1240,7 @@
           <a:p>
             <a:fld id="{87DE6118-2437-4B30-8E3C-4D2BE6020583}" type="datetimeFigureOut">
               <a:rPr lang="en-US" dirty="0"/>
-              <a:t>1/31/2019</a:t>
+              <a:t>2/3/2019</a:t>
             </a:fld>
             <a:endParaRPr lang="en-US" dirty="0"/>
           </a:p>
@@ -1404,7 +1405,7 @@
           <a:p>
             <a:fld id="{87DE6118-2437-4B30-8E3C-4D2BE6020583}" type="datetimeFigureOut">
               <a:rPr lang="en-US" dirty="0"/>
-              <a:t>1/31/2019</a:t>
+              <a:t>2/3/2019</a:t>
             </a:fld>
             <a:endParaRPr lang="en-US" dirty="0"/>
           </a:p>
@@ -1677,7 +1678,7 @@
             <a:fld id="{87DE6118-2437-4B30-8E3C-4D2BE6020583}" type="datetimeFigureOut">
               <a:rPr lang="en-US" dirty="0"/>
               <a:pPr/>
-              <a:t>1/31/2019</a:t>
+              <a:t>2/3/2019</a:t>
             </a:fld>
             <a:endParaRPr lang="en-US" dirty="0"/>
           </a:p>
@@ -2067,7 +2068,7 @@
           <a:p>
             <a:fld id="{87DE6118-2437-4B30-8E3C-4D2BE6020583}" type="datetimeFigureOut">
               <a:rPr lang="en-US" dirty="0"/>
-              <a:t>1/31/2019</a:t>
+              <a:t>2/3/2019</a:t>
             </a:fld>
             <a:endParaRPr lang="en-US" dirty="0"/>
           </a:p>
@@ -2539,7 +2540,7 @@
           <a:p>
             <a:fld id="{87DE6118-2437-4B30-8E3C-4D2BE6020583}" type="datetimeFigureOut">
               <a:rPr lang="en-US" dirty="0"/>
-              <a:t>1/31/2019</a:t>
+              <a:t>2/3/2019</a:t>
             </a:fld>
             <a:endParaRPr lang="en-US" dirty="0"/>
           </a:p>
@@ -2652,7 +2653,7 @@
           <a:p>
             <a:fld id="{87DE6118-2437-4B30-8E3C-4D2BE6020583}" type="datetimeFigureOut">
               <a:rPr lang="en-US" dirty="0"/>
-              <a:t>1/31/2019</a:t>
+              <a:t>2/3/2019</a:t>
             </a:fld>
             <a:endParaRPr lang="en-US" dirty="0"/>
           </a:p>
@@ -2742,7 +2743,7 @@
           <a:p>
             <a:fld id="{87DE6118-2437-4B30-8E3C-4D2BE6020583}" type="datetimeFigureOut">
               <a:rPr lang="en-US" dirty="0"/>
-              <a:t>1/31/2019</a:t>
+              <a:t>2/3/2019</a:t>
             </a:fld>
             <a:endParaRPr lang="en-US" dirty="0"/>
           </a:p>
@@ -3084,7 +3085,7 @@
             <a:fld id="{87DE6118-2437-4B30-8E3C-4D2BE6020583}" type="datetimeFigureOut">
               <a:rPr lang="en-US" dirty="0"/>
               <a:pPr/>
-              <a:t>1/31/2019</a:t>
+              <a:t>2/3/2019</a:t>
             </a:fld>
             <a:endParaRPr lang="en-US" dirty="0"/>
           </a:p>
@@ -3469,7 +3470,7 @@
             <a:fld id="{87DE6118-2437-4B30-8E3C-4D2BE6020583}" type="datetimeFigureOut">
               <a:rPr lang="en-US" dirty="0"/>
               <a:pPr/>
-              <a:t>1/31/2019</a:t>
+              <a:t>2/3/2019</a:t>
             </a:fld>
             <a:endParaRPr lang="en-US" dirty="0"/>
           </a:p>
@@ -3744,7 +3745,7 @@
             <a:fld id="{87DE6118-2437-4B30-8E3C-4D2BE6020583}" type="datetimeFigureOut">
               <a:rPr lang="en-US" dirty="0"/>
               <a:pPr/>
-              <a:t>1/31/2019</a:t>
+              <a:t>2/3/2019</a:t>
             </a:fld>
             <a:endParaRPr lang="en-US" dirty="0"/>
           </a:p>
@@ -4425,8 +4426,8 @@
         </p:blipFill>
         <p:spPr bwMode="auto">
           <a:xfrm>
-            <a:off x="8435399" y="2927377"/>
-            <a:ext cx="2598297" cy="3890856"/>
+            <a:off x="8706225" y="2701172"/>
+            <a:ext cx="2651321" cy="3970258"/>
           </a:xfrm>
           <a:prstGeom prst="rect">
             <a:avLst/>
@@ -4468,8 +4469,8 @@
         </p:blipFill>
         <p:spPr>
           <a:xfrm>
-            <a:off x="1432496" y="2927377"/>
-            <a:ext cx="6917077" cy="3890855"/>
+            <a:off x="1615187" y="2701172"/>
+            <a:ext cx="7058236" cy="3970257"/>
           </a:xfrm>
           <a:prstGeom prst="rect">
             <a:avLst/>
@@ -4532,21 +4533,7 @@
           <a:p>
             <a:r>
               <a:rPr lang="en-GB" dirty="0"/>
-              <a:t>Doodle Jump</a:t>
-            </a:r>
-          </a:p>
-          <a:p>
-            <a:pPr lvl="1"/>
-            <a:r>
-              <a:rPr lang="en-GB" dirty="0"/>
-              <a:t>Platformer </a:t>
-            </a:r>
-          </a:p>
-          <a:p>
-            <a:pPr lvl="1"/>
-            <a:r>
-              <a:rPr lang="en-GB" dirty="0"/>
-              <a:t>Replaces traditional movement mechanics with gyroscope controls and automatic jumping, limiting player choice </a:t>
+              <a:t>Doodle Jump is a platformer which replaces traditional movement mechanics with gyroscope controls and automatic jumping, limiting player choice </a:t>
             </a:r>
           </a:p>
           <a:p>
@@ -4603,12 +4590,20 @@
             <p:ph type="title"/>
           </p:nvPr>
         </p:nvSpPr>
-        <p:spPr/>
+        <p:spPr>
+          <a:xfrm>
+            <a:off x="1371600" y="685800"/>
+            <a:ext cx="9601200" cy="1485900"/>
+          </a:xfrm>
+        </p:spPr>
         <p:txBody>
           <a:bodyPr/>
           <a:lstStyle/>
           <a:p>
-            <a:endParaRPr lang="en-GB"/>
+            <a:r>
+              <a:rPr lang="en-GB" dirty="0"/>
+              <a:t>SPLATOON</a:t>
+            </a:r>
           </a:p>
         </p:txBody>
       </p:sp>
@@ -4628,15 +4623,136 @@
             <p:ph idx="1"/>
           </p:nvPr>
         </p:nvSpPr>
-        <p:spPr/>
+        <p:spPr>
+          <a:xfrm>
+            <a:off x="1371600" y="1390072"/>
+            <a:ext cx="9601200" cy="3581400"/>
+          </a:xfrm>
+        </p:spPr>
         <p:txBody>
           <a:bodyPr/>
           <a:lstStyle/>
           <a:p>
-            <a:endParaRPr lang="en-GB"/>
-          </a:p>
-        </p:txBody>
-      </p:sp>
+            <a:r>
+              <a:rPr lang="en-GB" dirty="0"/>
+              <a:t>Splatoon is a third-person shooter where instead of shooting one another, players complete a game mode objective by covering the area in ink. </a:t>
+            </a:r>
+          </a:p>
+          <a:p>
+            <a:r>
+              <a:rPr lang="en-GB" dirty="0"/>
+              <a:t>As well as this, players replenish their ammo by turning into a squid and swimming through their own paint colour rather than traditional reloading</a:t>
+            </a:r>
+          </a:p>
+          <a:p>
+            <a:r>
+              <a:rPr lang="en-GB" dirty="0"/>
+              <a:t>For example, in Turf Wars, the team with the most ground covered by the ink colour at the end of the timer is the winner</a:t>
+            </a:r>
+          </a:p>
+        </p:txBody>
+      </p:sp>
+      <p:grpSp>
+        <p:nvGrpSpPr>
+          <p:cNvPr id="5" name="Group 4">
+            <a:extLst>
+              <a:ext uri="{FF2B5EF4-FFF2-40B4-BE49-F238E27FC236}">
+                <a16:creationId xmlns:a16="http://schemas.microsoft.com/office/drawing/2014/main" id="{B84F7B6E-66C5-484B-B294-A37AE7867BA9}"/>
+              </a:ext>
+            </a:extLst>
+          </p:cNvPr>
+          <p:cNvGrpSpPr/>
+          <p:nvPr/>
+        </p:nvGrpSpPr>
+        <p:grpSpPr>
+          <a:xfrm>
+            <a:off x="997527" y="3574475"/>
+            <a:ext cx="11086995" cy="3084635"/>
+            <a:chOff x="2743200" y="4646197"/>
+            <a:chExt cx="7400926" cy="2059093"/>
+          </a:xfrm>
+        </p:grpSpPr>
+        <p:pic>
+          <p:nvPicPr>
+            <p:cNvPr id="2050" name="Picture 2" descr="Image result for splatoon">
+              <a:extLst>
+                <a:ext uri="{FF2B5EF4-FFF2-40B4-BE49-F238E27FC236}">
+                  <a16:creationId xmlns:a16="http://schemas.microsoft.com/office/drawing/2014/main" id="{24F1522F-0DA1-4C1F-A15A-A26683263A81}"/>
+                </a:ext>
+              </a:extLst>
+            </p:cNvPr>
+            <p:cNvPicPr>
+              <a:picLocks noChangeAspect="1" noChangeArrowheads="1"/>
+            </p:cNvPicPr>
+            <p:nvPr/>
+          </p:nvPicPr>
+          <p:blipFill>
+            <a:blip r:embed="rId3">
+              <a:extLst>
+                <a:ext uri="{28A0092B-C50C-407E-A947-70E740481C1C}">
+                  <a14:useLocalDpi xmlns:a14="http://schemas.microsoft.com/office/drawing/2010/main" val="0"/>
+                </a:ext>
+              </a:extLst>
+            </a:blip>
+            <a:srcRect/>
+            <a:stretch>
+              <a:fillRect/>
+            </a:stretch>
+          </p:blipFill>
+          <p:spPr bwMode="auto">
+            <a:xfrm>
+              <a:off x="6486526" y="4646197"/>
+              <a:ext cx="3657600" cy="2059093"/>
+            </a:xfrm>
+            <a:prstGeom prst="rect">
+              <a:avLst/>
+            </a:prstGeom>
+            <a:noFill/>
+            <a:extLst>
+              <a:ext uri="{909E8E84-426E-40DD-AFC4-6F175D3DCCD1}">
+                <a14:hiddenFill xmlns:a14="http://schemas.microsoft.com/office/drawing/2010/main">
+                  <a:solidFill>
+                    <a:srgbClr val="FFFFFF"/>
+                  </a:solidFill>
+                </a14:hiddenFill>
+              </a:ext>
+            </a:extLst>
+          </p:spPr>
+        </p:pic>
+        <p:pic>
+          <p:nvPicPr>
+            <p:cNvPr id="4" name="Online Media 3">
+              <a:hlinkClick r:id="" action="ppaction://media"/>
+              <a:extLst>
+                <a:ext uri="{FF2B5EF4-FFF2-40B4-BE49-F238E27FC236}">
+                  <a16:creationId xmlns:a16="http://schemas.microsoft.com/office/drawing/2014/main" id="{EA7D9BFA-E54B-456F-9A5B-8FB5910B434C}"/>
+                </a:ext>
+              </a:extLst>
+            </p:cNvPr>
+            <p:cNvPicPr>
+              <a:picLocks noRot="1" noChangeAspect="1"/>
+            </p:cNvPicPr>
+            <p:nvPr>
+              <a:videoFile r:link="rId1"/>
+            </p:nvPr>
+          </p:nvPicPr>
+          <p:blipFill>
+            <a:blip r:embed="rId4"/>
+            <a:stretch>
+              <a:fillRect/>
+            </a:stretch>
+          </p:blipFill>
+          <p:spPr>
+            <a:xfrm>
+              <a:off x="2743200" y="4647890"/>
+              <a:ext cx="3657600" cy="2057400"/>
+            </a:xfrm>
+            <a:prstGeom prst="rect">
+              <a:avLst/>
+            </a:prstGeom>
+          </p:spPr>
+        </p:pic>
+      </p:grpSp>
     </p:spTree>
     <p:extLst>
       <p:ext uri="{BB962C8B-B14F-4D97-AF65-F5344CB8AC3E}">
@@ -4672,7 +4788,7 @@
           <p:cNvPr id="2" name="Title 1">
             <a:extLst>
               <a:ext uri="{FF2B5EF4-FFF2-40B4-BE49-F238E27FC236}">
-                <a16:creationId xmlns:a16="http://schemas.microsoft.com/office/drawing/2014/main" id="{F309ACA0-22A0-4620-9660-587D0517B6B1}"/>
+                <a16:creationId xmlns:a16="http://schemas.microsoft.com/office/drawing/2014/main" id="{37A60BAA-BC1F-44DF-A4E5-9EFC480C939B}"/>
               </a:ext>
             </a:extLst>
           </p:cNvPr>
@@ -4680,7 +4796,7 @@
             <a:spLocks noGrp="1"/>
           </p:cNvSpPr>
           <p:nvPr>
-            <p:ph type="ctrTitle"/>
+            <p:ph type="title"/>
           </p:nvPr>
         </p:nvSpPr>
         <p:spPr/>
@@ -4690,17 +4806,17 @@
           <a:p>
             <a:r>
               <a:rPr lang="en-GB" dirty="0"/>
-              <a:t>Game ideas</a:t>
-            </a:r>
-          </a:p>
-        </p:txBody>
-      </p:sp>
-      <p:sp>
-        <p:nvSpPr>
-          <p:cNvPr id="3" name="Subtitle 2">
+              <a:t>VVVVVV</a:t>
+            </a:r>
+          </a:p>
+        </p:txBody>
+      </p:sp>
+      <p:sp>
+        <p:nvSpPr>
+          <p:cNvPr id="3" name="Content Placeholder 2">
             <a:extLst>
               <a:ext uri="{FF2B5EF4-FFF2-40B4-BE49-F238E27FC236}">
-                <a16:creationId xmlns:a16="http://schemas.microsoft.com/office/drawing/2014/main" id="{51F38B95-B381-4CD3-9DCA-213D2AD2EEBE}"/>
+                <a16:creationId xmlns:a16="http://schemas.microsoft.com/office/drawing/2014/main" id="{CB1E7675-7D9F-48EF-BADC-D02A59D35109}"/>
               </a:ext>
             </a:extLst>
           </p:cNvPr>
@@ -4708,22 +4824,135 @@
             <a:spLocks noGrp="1"/>
           </p:cNvSpPr>
           <p:nvPr>
-            <p:ph type="subTitle" idx="1"/>
-          </p:nvPr>
-        </p:nvSpPr>
-        <p:spPr/>
+            <p:ph idx="1"/>
+          </p:nvPr>
+        </p:nvSpPr>
+        <p:spPr>
+          <a:xfrm>
+            <a:off x="1371600" y="1500910"/>
+            <a:ext cx="9601200" cy="3581400"/>
+          </a:xfrm>
+        </p:spPr>
         <p:txBody>
           <a:bodyPr/>
           <a:lstStyle/>
           <a:p>
-            <a:endParaRPr lang="en-GB" dirty="0"/>
-          </a:p>
-        </p:txBody>
-      </p:sp>
+            <a:r>
+              <a:rPr lang="en-GB" dirty="0"/>
+              <a:t>VVVVVV is a retro-looking 2D platformer where jumping is removed and is replaced with the ability to invert gravity</a:t>
+            </a:r>
+          </a:p>
+          <a:p>
+            <a:r>
+              <a:rPr lang="en-GB" dirty="0"/>
+              <a:t>Players had to flip gravity at the correct moment in order to avoid spikes and progress through the level</a:t>
+            </a:r>
+          </a:p>
+        </p:txBody>
+      </p:sp>
+      <p:grpSp>
+        <p:nvGrpSpPr>
+          <p:cNvPr id="5" name="Group 4">
+            <a:extLst>
+              <a:ext uri="{FF2B5EF4-FFF2-40B4-BE49-F238E27FC236}">
+                <a16:creationId xmlns:a16="http://schemas.microsoft.com/office/drawing/2014/main" id="{8479AE3A-C510-4412-905F-C76BBDBC5D0D}"/>
+              </a:ext>
+            </a:extLst>
+          </p:cNvPr>
+          <p:cNvGrpSpPr/>
+          <p:nvPr/>
+        </p:nvGrpSpPr>
+        <p:grpSpPr>
+          <a:xfrm>
+            <a:off x="822997" y="3116116"/>
+            <a:ext cx="11260983" cy="3127660"/>
+            <a:chOff x="3482110" y="3840020"/>
+            <a:chExt cx="7407566" cy="2057400"/>
+          </a:xfrm>
+        </p:grpSpPr>
+        <p:pic>
+          <p:nvPicPr>
+            <p:cNvPr id="4" name="Online Media 3">
+              <a:hlinkClick r:id="" action="ppaction://media"/>
+              <a:extLst>
+                <a:ext uri="{FF2B5EF4-FFF2-40B4-BE49-F238E27FC236}">
+                  <a16:creationId xmlns:a16="http://schemas.microsoft.com/office/drawing/2014/main" id="{66C0CA8D-16D6-454C-996E-F90F92AFF154}"/>
+                </a:ext>
+              </a:extLst>
+            </p:cNvPr>
+            <p:cNvPicPr>
+              <a:picLocks noRot="1" noChangeAspect="1"/>
+            </p:cNvPicPr>
+            <p:nvPr>
+              <a:videoFile r:link="rId1"/>
+            </p:nvPr>
+          </p:nvPicPr>
+          <p:blipFill>
+            <a:blip r:embed="rId3"/>
+            <a:stretch>
+              <a:fillRect/>
+            </a:stretch>
+          </p:blipFill>
+          <p:spPr>
+            <a:xfrm>
+              <a:off x="3482110" y="3840020"/>
+              <a:ext cx="3657600" cy="2057400"/>
+            </a:xfrm>
+            <a:prstGeom prst="rect">
+              <a:avLst/>
+            </a:prstGeom>
+          </p:spPr>
+        </p:pic>
+        <p:pic>
+          <p:nvPicPr>
+            <p:cNvPr id="3074" name="Picture 2" descr="Image result for vvvvvv screenshot">
+              <a:extLst>
+                <a:ext uri="{FF2B5EF4-FFF2-40B4-BE49-F238E27FC236}">
+                  <a16:creationId xmlns:a16="http://schemas.microsoft.com/office/drawing/2014/main" id="{5734CDD9-09B7-4E18-9362-239158AED164}"/>
+                </a:ext>
+              </a:extLst>
+            </p:cNvPr>
+            <p:cNvPicPr>
+              <a:picLocks noChangeAspect="1" noChangeArrowheads="1"/>
+            </p:cNvPicPr>
+            <p:nvPr/>
+          </p:nvPicPr>
+          <p:blipFill rotWithShape="1">
+            <a:blip r:embed="rId4">
+              <a:extLst>
+                <a:ext uri="{28A0092B-C50C-407E-A947-70E740481C1C}">
+                  <a14:useLocalDpi xmlns:a14="http://schemas.microsoft.com/office/drawing/2010/main" val="0"/>
+                </a:ext>
+              </a:extLst>
+            </a:blip>
+            <a:srcRect r="16667"/>
+            <a:stretch/>
+          </p:blipFill>
+          <p:spPr bwMode="auto">
+            <a:xfrm>
+              <a:off x="7232076" y="3840020"/>
+              <a:ext cx="3657600" cy="2057400"/>
+            </a:xfrm>
+            <a:prstGeom prst="rect">
+              <a:avLst/>
+            </a:prstGeom>
+            <a:noFill/>
+            <a:extLst>
+              <a:ext uri="{909E8E84-426E-40DD-AFC4-6F175D3DCCD1}">
+                <a14:hiddenFill xmlns:a14="http://schemas.microsoft.com/office/drawing/2010/main">
+                  <a:solidFill>
+                    <a:srgbClr val="FFFFFF"/>
+                  </a:solidFill>
+                </a14:hiddenFill>
+              </a:ext>
+            </a:extLst>
+          </p:spPr>
+        </p:pic>
+      </p:grpSp>
     </p:spTree>
     <p:extLst>
       <p:ext uri="{BB962C8B-B14F-4D97-AF65-F5344CB8AC3E}">
-        <p14:creationId xmlns:p14="http://schemas.microsoft.com/office/powerpoint/2010/main" val="3547581481"/>
+        <p14:creationId xmlns:p14="http://schemas.microsoft.com/office/powerpoint/2010/main" val="2136848087"/>
       </p:ext>
     </p:extLst>
   </p:cSld>
@@ -4755,6 +4984,89 @@
           <p:cNvPr id="2" name="Title 1">
             <a:extLst>
               <a:ext uri="{FF2B5EF4-FFF2-40B4-BE49-F238E27FC236}">
+                <a16:creationId xmlns:a16="http://schemas.microsoft.com/office/drawing/2014/main" id="{F309ACA0-22A0-4620-9660-587D0517B6B1}"/>
+              </a:ext>
+            </a:extLst>
+          </p:cNvPr>
+          <p:cNvSpPr>
+            <a:spLocks noGrp="1"/>
+          </p:cNvSpPr>
+          <p:nvPr>
+            <p:ph type="ctrTitle"/>
+          </p:nvPr>
+        </p:nvSpPr>
+        <p:spPr/>
+        <p:txBody>
+          <a:bodyPr/>
+          <a:lstStyle/>
+          <a:p>
+            <a:r>
+              <a:rPr lang="en-GB" dirty="0"/>
+              <a:t>Game ideas</a:t>
+            </a:r>
+          </a:p>
+        </p:txBody>
+      </p:sp>
+      <p:sp>
+        <p:nvSpPr>
+          <p:cNvPr id="3" name="Subtitle 2">
+            <a:extLst>
+              <a:ext uri="{FF2B5EF4-FFF2-40B4-BE49-F238E27FC236}">
+                <a16:creationId xmlns:a16="http://schemas.microsoft.com/office/drawing/2014/main" id="{51F38B95-B381-4CD3-9DCA-213D2AD2EEBE}"/>
+              </a:ext>
+            </a:extLst>
+          </p:cNvPr>
+          <p:cNvSpPr>
+            <a:spLocks noGrp="1"/>
+          </p:cNvSpPr>
+          <p:nvPr>
+            <p:ph type="subTitle" idx="1"/>
+          </p:nvPr>
+        </p:nvSpPr>
+        <p:spPr/>
+        <p:txBody>
+          <a:bodyPr/>
+          <a:lstStyle/>
+          <a:p>
+            <a:endParaRPr lang="en-GB" dirty="0"/>
+          </a:p>
+        </p:txBody>
+      </p:sp>
+    </p:spTree>
+    <p:extLst>
+      <p:ext uri="{BB962C8B-B14F-4D97-AF65-F5344CB8AC3E}">
+        <p14:creationId xmlns:p14="http://schemas.microsoft.com/office/powerpoint/2010/main" val="3547581481"/>
+      </p:ext>
+    </p:extLst>
+  </p:cSld>
+  <p:clrMapOvr>
+    <a:masterClrMapping/>
+  </p:clrMapOvr>
+</p:sld>
+</file>
+
+<file path=ppt/slides/slide6.xml><?xml version="1.0" encoding="utf-8"?>
+<p:sld xmlns:a="http://schemas.openxmlformats.org/drawingml/2006/main" xmlns:r="http://schemas.openxmlformats.org/officeDocument/2006/relationships" xmlns:p="http://schemas.openxmlformats.org/presentationml/2006/main">
+  <p:cSld>
+    <p:spTree>
+      <p:nvGrpSpPr>
+        <p:cNvPr id="1" name=""/>
+        <p:cNvGrpSpPr/>
+        <p:nvPr/>
+      </p:nvGrpSpPr>
+      <p:grpSpPr>
+        <a:xfrm>
+          <a:off x="0" y="0"/>
+          <a:ext cx="0" cy="0"/>
+          <a:chOff x="0" y="0"/>
+          <a:chExt cx="0" cy="0"/>
+        </a:xfrm>
+      </p:grpSpPr>
+      <p:sp>
+        <p:nvSpPr>
+          <p:cNvPr id="2" name="Title 1">
+            <a:extLst>
+              <a:ext uri="{FF2B5EF4-FFF2-40B4-BE49-F238E27FC236}">
                 <a16:creationId xmlns:a16="http://schemas.microsoft.com/office/drawing/2014/main" id="{B2185978-5377-4EA4-A18E-3EC2D11AADB1}"/>
               </a:ext>
             </a:extLst>
@@ -4806,7 +5118,9 @@
         </p:nvSpPr>
         <p:spPr/>
         <p:txBody>
-          <a:bodyPr/>
+          <a:bodyPr>
+            <a:normAutofit lnSpcReduction="10000"/>
+          </a:bodyPr>
           <a:lstStyle/>
           <a:p>
             <a:r>
@@ -4852,6 +5166,12 @@
             <a:r>
               <a:rPr lang="en-GB" dirty="0"/>
               <a:t>If the beanstalk is too long, it will grow into the platform and make it break</a:t>
+            </a:r>
+          </a:p>
+          <a:p>
+            <a:r>
+              <a:rPr lang="en-GB" dirty="0"/>
+              <a:t>Themes:</a:t>
             </a:r>
           </a:p>
         </p:txBody>
@@ -4904,7 +5224,7 @@
             <a:graphicData uri="http://schemas.openxmlformats.org/presentationml/2006/ole">
               <mc:AlternateContent xmlns:mc="http://schemas.openxmlformats.org/markup-compatibility/2006">
                 <mc:Choice xmlns:v="urn:schemas-microsoft-com:vml" Requires="v">
-                  <p:oleObj spid="_x0000_s1052" name="Image" r:id="rId3" imgW="8152200" imgH="2831400" progId="Photoshop.Image.15">
+                  <p:oleObj spid="_x0000_s1078" name="Image" r:id="rId3" imgW="8152200" imgH="2831400" progId="Photoshop.Image.15">
                     <p:embed/>
                   </p:oleObj>
                 </mc:Choice>
@@ -4967,7 +5287,7 @@
             <a:graphicData uri="http://schemas.openxmlformats.org/presentationml/2006/ole">
               <mc:AlternateContent xmlns:mc="http://schemas.openxmlformats.org/markup-compatibility/2006">
                 <mc:Choice xmlns:v="urn:schemas-microsoft-com:vml" Requires="v">
-                  <p:oleObj spid="_x0000_s1053" name="Image" r:id="rId5" imgW="8164800" imgH="2818800" progId="Photoshop.Image.15">
+                  <p:oleObj spid="_x0000_s1079" name="Image" r:id="rId5" imgW="8164800" imgH="2818800" progId="Photoshop.Image.15">
                     <p:embed/>
                   </p:oleObj>
                 </mc:Choice>
@@ -5016,7 +5336,7 @@
 </p:sld>
 </file>
 
-<file path=ppt/slides/slide6.xml><?xml version="1.0" encoding="utf-8"?>
+<file path=ppt/slides/slide7.xml><?xml version="1.0" encoding="utf-8"?>
 <p:sld xmlns:a="http://schemas.openxmlformats.org/drawingml/2006/main" xmlns:r="http://schemas.openxmlformats.org/officeDocument/2006/relationships" xmlns:p="http://schemas.openxmlformats.org/presentationml/2006/main">
   <p:cSld>
     <p:spTree>
@@ -5098,7 +5418,7 @@
         <p:spPr/>
         <p:txBody>
           <a:bodyPr>
-            <a:normAutofit/>
+            <a:normAutofit lnSpcReduction="10000"/>
           </a:bodyPr>
           <a:lstStyle/>
           <a:p>
@@ -5145,6 +5465,12 @@
             <a:r>
               <a:rPr lang="en-GB" dirty="0"/>
               <a:t>The game could also work in real-time, with AI/environment being moved constantly</a:t>
+            </a:r>
+          </a:p>
+          <a:p>
+            <a:r>
+              <a:rPr lang="en-GB" dirty="0"/>
+              <a:t>Themes:</a:t>
             </a:r>
           </a:p>
           <a:p>
@@ -5166,7 +5492,7 @@
 </p:sld>
 </file>
 
-<file path=ppt/slides/slide7.xml><?xml version="1.0" encoding="utf-8"?>
+<file path=ppt/slides/slide8.xml><?xml version="1.0" encoding="utf-8"?>
 <p:sld xmlns:a="http://schemas.openxmlformats.org/drawingml/2006/main" xmlns:r="http://schemas.openxmlformats.org/officeDocument/2006/relationships" xmlns:p="http://schemas.openxmlformats.org/presentationml/2006/main">
   <p:cSld>
     <p:spTree>

</xml_diff>

<commit_message>
upload final research and ideas changes
</commit_message>
<xml_diff>
--- a/Research/Research and Ideas - Amy.pptx
+++ b/Research/Research and Ideas - Amy.pptx
@@ -5116,10 +5116,15 @@
             <p:ph idx="1"/>
           </p:nvPr>
         </p:nvSpPr>
-        <p:spPr/>
+        <p:spPr>
+          <a:xfrm>
+            <a:off x="1371600" y="2285999"/>
+            <a:ext cx="9601200" cy="4253345"/>
+          </a:xfrm>
+        </p:spPr>
         <p:txBody>
           <a:bodyPr>
-            <a:normAutofit lnSpcReduction="10000"/>
+            <a:normAutofit fontScale="92500" lnSpcReduction="20000"/>
           </a:bodyPr>
           <a:lstStyle/>
           <a:p>
@@ -5171,7 +5176,21 @@
           <a:p>
             <a:r>
               <a:rPr lang="en-GB" dirty="0"/>
-              <a:t>Themes:</a:t>
+              <a:t>Themes</a:t>
+            </a:r>
+          </a:p>
+          <a:p>
+            <a:pPr lvl="1"/>
+            <a:r>
+              <a:rPr lang="en-GB" dirty="0"/>
+              <a:t>Based on stationery, players could hold to pull the length of pencil out of a pen pot until they think it is long enough</a:t>
+            </a:r>
+          </a:p>
+          <a:p>
+            <a:pPr lvl="1"/>
+            <a:r>
+              <a:rPr lang="en-GB" dirty="0"/>
+              <a:t>Players squeeze an icing bag to create a bridge and help a gingerbread man across gingerbread platforms</a:t>
             </a:r>
           </a:p>
         </p:txBody>
@@ -5224,7 +5243,7 @@
             <a:graphicData uri="http://schemas.openxmlformats.org/presentationml/2006/ole">
               <mc:AlternateContent xmlns:mc="http://schemas.openxmlformats.org/markup-compatibility/2006">
                 <mc:Choice xmlns:v="urn:schemas-microsoft-com:vml" Requires="v">
-                  <p:oleObj spid="_x0000_s1078" name="Image" r:id="rId3" imgW="8152200" imgH="2831400" progId="Photoshop.Image.15">
+                  <p:oleObj spid="_x0000_s1098" name="Image" r:id="rId3" imgW="8152200" imgH="2831400" progId="Photoshop.Image.15">
                     <p:embed/>
                   </p:oleObj>
                 </mc:Choice>
@@ -5287,7 +5306,7 @@
             <a:graphicData uri="http://schemas.openxmlformats.org/presentationml/2006/ole">
               <mc:AlternateContent xmlns:mc="http://schemas.openxmlformats.org/markup-compatibility/2006">
                 <mc:Choice xmlns:v="urn:schemas-microsoft-com:vml" Requires="v">
-                  <p:oleObj spid="_x0000_s1079" name="Image" r:id="rId5" imgW="8164800" imgH="2818800" progId="Photoshop.Image.15">
+                  <p:oleObj spid="_x0000_s1099" name="Image" r:id="rId5" imgW="8164800" imgH="2818800" progId="Photoshop.Image.15">
                     <p:embed/>
                   </p:oleObj>
                 </mc:Choice>
@@ -5415,10 +5434,15 @@
             <p:ph idx="1"/>
           </p:nvPr>
         </p:nvSpPr>
-        <p:spPr/>
+        <p:spPr>
+          <a:xfrm>
+            <a:off x="1371600" y="2285999"/>
+            <a:ext cx="9601200" cy="4188691"/>
+          </a:xfrm>
+        </p:spPr>
         <p:txBody>
           <a:bodyPr>
-            <a:normAutofit lnSpcReduction="10000"/>
+            <a:normAutofit fontScale="92500" lnSpcReduction="20000"/>
           </a:bodyPr>
           <a:lstStyle/>
           <a:p>
@@ -5470,7 +5494,21 @@
           <a:p>
             <a:r>
               <a:rPr lang="en-GB" dirty="0"/>
-              <a:t>Themes:</a:t>
+              <a:t>Themes</a:t>
+            </a:r>
+          </a:p>
+          <a:p>
+            <a:pPr lvl="1"/>
+            <a:r>
+              <a:rPr lang="en-GB" dirty="0"/>
+              <a:t>School and trying to avoid being caught skipping lessons</a:t>
+            </a:r>
+          </a:p>
+          <a:p>
+            <a:pPr lvl="1"/>
+            <a:r>
+              <a:rPr lang="en-GB" dirty="0"/>
+              <a:t>A mouse stealing different ingredients from a pantry and trying to avoid being caught by the owners</a:t>
             </a:r>
           </a:p>
           <a:p>
@@ -5559,6 +5597,36 @@
         <p:txBody>
           <a:bodyPr/>
           <a:lstStyle/>
+          <a:p>
+            <a:r>
+              <a:rPr lang="en-GB" dirty="0"/>
+              <a:t>Maze game where you cannot see but the player solves the puzzle using “echo location”</a:t>
+            </a:r>
+          </a:p>
+          <a:p>
+            <a:pPr lvl="1"/>
+            <a:r>
+              <a:rPr lang="en-GB" dirty="0"/>
+              <a:t>Themes: A bat or oilbird navigating cave system</a:t>
+            </a:r>
+          </a:p>
+          <a:p>
+            <a:r>
+              <a:rPr lang="en-GB" dirty="0"/>
+              <a:t>Racing game where the car accelerates itself and you can only brake and steer. Maybe use timing/precision to avoid obstacles.</a:t>
+            </a:r>
+          </a:p>
+          <a:p>
+            <a:r>
+              <a:rPr lang="en-GB" dirty="0"/>
+              <a:t>Drag racing game where you shift gears by answering simple maths </a:t>
+            </a:r>
+            <a:r>
+              <a:rPr lang="en-GB"/>
+              <a:t>questions correctly</a:t>
+            </a:r>
+            <a:endParaRPr lang="en-GB" dirty="0"/>
+          </a:p>
           <a:p>
             <a:pPr marL="0" indent="0">
               <a:buNone/>

</xml_diff>